<commit_message>
update final review slides
</commit_message>
<xml_diff>
--- a/static/talks/PhD_final_review_2019/fig/Presentation1.pptx
+++ b/static/talks/PhD_final_review_2019/fig/Presentation1.pptx
@@ -5,11 +5,12 @@
     <p:sldMasterId id="2147483648" r:id="rId1"/>
   </p:sldMasterIdLst>
   <p:notesMasterIdLst>
-    <p:notesMasterId r:id="rId4"/>
+    <p:notesMasterId r:id="rId5"/>
   </p:notesMasterIdLst>
   <p:sldIdLst>
     <p:sldId id="258" r:id="rId2"/>
     <p:sldId id="259" r:id="rId3"/>
+    <p:sldId id="260" r:id="rId4"/>
   </p:sldIdLst>
   <p:sldSz cx="12192000" cy="6858000"/>
   <p:notesSz cx="6858000" cy="9144000"/>
@@ -198,7 +199,7 @@
           <a:p>
             <a:fld id="{9AED9E68-B250-4039-9C55-94B7F2BB217A}" type="datetimeFigureOut">
               <a:rPr lang="en-AU" smtClean="0"/>
-              <a:t>13/03/2019</a:t>
+              <a:t>18/03/2019</a:t>
             </a:fld>
             <a:endParaRPr lang="en-AU"/>
           </a:p>
@@ -550,6 +551,90 @@
 </p:notes>
 </file>
 
+<file path=ppt/notesSlides/notesSlide2.xml><?xml version="1.0" encoding="utf-8"?>
+<p:notes xmlns:a="http://schemas.openxmlformats.org/drawingml/2006/main" xmlns:r="http://schemas.openxmlformats.org/officeDocument/2006/relationships" xmlns:p="http://schemas.openxmlformats.org/presentationml/2006/main">
+  <p:cSld>
+    <p:spTree>
+      <p:nvGrpSpPr>
+        <p:cNvPr id="1" name=""/>
+        <p:cNvGrpSpPr/>
+        <p:nvPr/>
+      </p:nvGrpSpPr>
+      <p:grpSpPr>
+        <a:xfrm>
+          <a:off x="0" y="0"/>
+          <a:ext cx="0" cy="0"/>
+          <a:chOff x="0" y="0"/>
+          <a:chExt cx="0" cy="0"/>
+        </a:xfrm>
+      </p:grpSpPr>
+      <p:sp>
+        <p:nvSpPr>
+          <p:cNvPr id="2" name="Slide Image Placeholder 1"/>
+          <p:cNvSpPr>
+            <a:spLocks noGrp="1" noRot="1" noChangeAspect="1"/>
+          </p:cNvSpPr>
+          <p:nvPr>
+            <p:ph type="sldImg"/>
+          </p:nvPr>
+        </p:nvSpPr>
+        <p:spPr/>
+      </p:sp>
+      <p:sp>
+        <p:nvSpPr>
+          <p:cNvPr id="3" name="Notes Placeholder 2"/>
+          <p:cNvSpPr>
+            <a:spLocks noGrp="1"/>
+          </p:cNvSpPr>
+          <p:nvPr>
+            <p:ph type="body" idx="1"/>
+          </p:nvPr>
+        </p:nvSpPr>
+        <p:spPr/>
+        <p:txBody>
+          <a:bodyPr/>
+          <a:lstStyle/>
+          <a:p>
+            <a:endParaRPr lang="en-AU" dirty="0"/>
+          </a:p>
+        </p:txBody>
+      </p:sp>
+      <p:sp>
+        <p:nvSpPr>
+          <p:cNvPr id="4" name="Slide Number Placeholder 3"/>
+          <p:cNvSpPr>
+            <a:spLocks noGrp="1"/>
+          </p:cNvSpPr>
+          <p:nvPr>
+            <p:ph type="sldNum" sz="quarter" idx="10"/>
+          </p:nvPr>
+        </p:nvSpPr>
+        <p:spPr/>
+        <p:txBody>
+          <a:bodyPr/>
+          <a:lstStyle/>
+          <a:p>
+            <a:fld id="{4D65A108-87A1-4893-8580-F925E1DC462C}" type="slidenum">
+              <a:rPr lang="en-AU" smtClean="0"/>
+              <a:t>3</a:t>
+            </a:fld>
+            <a:endParaRPr lang="en-AU"/>
+          </a:p>
+        </p:txBody>
+      </p:sp>
+    </p:spTree>
+    <p:extLst>
+      <p:ext uri="{BB962C8B-B14F-4D97-AF65-F5344CB8AC3E}">
+        <p14:creationId xmlns:p14="http://schemas.microsoft.com/office/powerpoint/2010/main" val="1434447664"/>
+      </p:ext>
+    </p:extLst>
+  </p:cSld>
+  <p:clrMapOvr>
+    <a:masterClrMapping/>
+  </p:clrMapOvr>
+</p:notes>
+</file>
+
 <file path=ppt/slideLayouts/slideLayout1.xml><?xml version="1.0" encoding="utf-8"?>
 <p:sldLayout xmlns:a="http://schemas.openxmlformats.org/drawingml/2006/main" xmlns:r="http://schemas.openxmlformats.org/officeDocument/2006/relationships" xmlns:p="http://schemas.openxmlformats.org/presentationml/2006/main" type="title" preserve="1">
   <p:cSld name="Title Slide">
@@ -681,7 +766,7 @@
           <a:p>
             <a:fld id="{19DA6A2B-8421-449D-BD94-DB78AC0E850D}" type="datetimeFigureOut">
               <a:rPr lang="en-AU" smtClean="0"/>
-              <a:t>13/03/2019</a:t>
+              <a:t>18/03/2019</a:t>
             </a:fld>
             <a:endParaRPr lang="en-AU"/>
           </a:p>
@@ -851,7 +936,7 @@
           <a:p>
             <a:fld id="{19DA6A2B-8421-449D-BD94-DB78AC0E850D}" type="datetimeFigureOut">
               <a:rPr lang="en-AU" smtClean="0"/>
-              <a:t>13/03/2019</a:t>
+              <a:t>18/03/2019</a:t>
             </a:fld>
             <a:endParaRPr lang="en-AU"/>
           </a:p>
@@ -1031,7 +1116,7 @@
           <a:p>
             <a:fld id="{19DA6A2B-8421-449D-BD94-DB78AC0E850D}" type="datetimeFigureOut">
               <a:rPr lang="en-AU" smtClean="0"/>
-              <a:t>13/03/2019</a:t>
+              <a:t>18/03/2019</a:t>
             </a:fld>
             <a:endParaRPr lang="en-AU"/>
           </a:p>
@@ -1201,7 +1286,7 @@
           <a:p>
             <a:fld id="{19DA6A2B-8421-449D-BD94-DB78AC0E850D}" type="datetimeFigureOut">
               <a:rPr lang="en-AU" smtClean="0"/>
-              <a:t>13/03/2019</a:t>
+              <a:t>18/03/2019</a:t>
             </a:fld>
             <a:endParaRPr lang="en-AU"/>
           </a:p>
@@ -1447,7 +1532,7 @@
           <a:p>
             <a:fld id="{19DA6A2B-8421-449D-BD94-DB78AC0E850D}" type="datetimeFigureOut">
               <a:rPr lang="en-AU" smtClean="0"/>
-              <a:t>13/03/2019</a:t>
+              <a:t>18/03/2019</a:t>
             </a:fld>
             <a:endParaRPr lang="en-AU"/>
           </a:p>
@@ -1679,7 +1764,7 @@
           <a:p>
             <a:fld id="{19DA6A2B-8421-449D-BD94-DB78AC0E850D}" type="datetimeFigureOut">
               <a:rPr lang="en-AU" smtClean="0"/>
-              <a:t>13/03/2019</a:t>
+              <a:t>18/03/2019</a:t>
             </a:fld>
             <a:endParaRPr lang="en-AU"/>
           </a:p>
@@ -2046,7 +2131,7 @@
           <a:p>
             <a:fld id="{19DA6A2B-8421-449D-BD94-DB78AC0E850D}" type="datetimeFigureOut">
               <a:rPr lang="en-AU" smtClean="0"/>
-              <a:t>13/03/2019</a:t>
+              <a:t>18/03/2019</a:t>
             </a:fld>
             <a:endParaRPr lang="en-AU"/>
           </a:p>
@@ -2164,7 +2249,7 @@
           <a:p>
             <a:fld id="{19DA6A2B-8421-449D-BD94-DB78AC0E850D}" type="datetimeFigureOut">
               <a:rPr lang="en-AU" smtClean="0"/>
-              <a:t>13/03/2019</a:t>
+              <a:t>18/03/2019</a:t>
             </a:fld>
             <a:endParaRPr lang="en-AU"/>
           </a:p>
@@ -2259,7 +2344,7 @@
           <a:p>
             <a:fld id="{19DA6A2B-8421-449D-BD94-DB78AC0E850D}" type="datetimeFigureOut">
               <a:rPr lang="en-AU" smtClean="0"/>
-              <a:t>13/03/2019</a:t>
+              <a:t>18/03/2019</a:t>
             </a:fld>
             <a:endParaRPr lang="en-AU"/>
           </a:p>
@@ -2536,7 +2621,7 @@
           <a:p>
             <a:fld id="{19DA6A2B-8421-449D-BD94-DB78AC0E850D}" type="datetimeFigureOut">
               <a:rPr lang="en-AU" smtClean="0"/>
-              <a:t>13/03/2019</a:t>
+              <a:t>18/03/2019</a:t>
             </a:fld>
             <a:endParaRPr lang="en-AU"/>
           </a:p>
@@ -2789,7 +2874,7 @@
           <a:p>
             <a:fld id="{19DA6A2B-8421-449D-BD94-DB78AC0E850D}" type="datetimeFigureOut">
               <a:rPr lang="en-AU" smtClean="0"/>
-              <a:t>13/03/2019</a:t>
+              <a:t>18/03/2019</a:t>
             </a:fld>
             <a:endParaRPr lang="en-AU"/>
           </a:p>
@@ -3002,7 +3087,7 @@
           <a:p>
             <a:fld id="{19DA6A2B-8421-449D-BD94-DB78AC0E850D}" type="datetimeFigureOut">
               <a:rPr lang="en-AU" smtClean="0"/>
-              <a:t>13/03/2019</a:t>
+              <a:t>18/03/2019</a:t>
             </a:fld>
             <a:endParaRPr lang="en-AU"/>
           </a:p>
@@ -4005,6 +4090,269 @@
     <p:extLst>
       <p:ext uri="{BB962C8B-B14F-4D97-AF65-F5344CB8AC3E}">
         <p14:creationId xmlns:p14="http://schemas.microsoft.com/office/powerpoint/2010/main" val="1572920782"/>
+      </p:ext>
+    </p:extLst>
+  </p:cSld>
+  <p:clrMapOvr>
+    <a:masterClrMapping/>
+  </p:clrMapOvr>
+  <p:timing>
+    <p:tnLst>
+      <p:par>
+        <p:cTn id="1" dur="indefinite" restart="never" nodeType="tmRoot"/>
+      </p:par>
+    </p:tnLst>
+  </p:timing>
+</p:sld>
+</file>
+
+<file path=ppt/slides/slide3.xml><?xml version="1.0" encoding="utf-8"?>
+<p:sld xmlns:a="http://schemas.openxmlformats.org/drawingml/2006/main" xmlns:r="http://schemas.openxmlformats.org/officeDocument/2006/relationships" xmlns:p="http://schemas.openxmlformats.org/presentationml/2006/main">
+  <p:cSld>
+    <p:spTree>
+      <p:nvGrpSpPr>
+        <p:cNvPr id="1" name=""/>
+        <p:cNvGrpSpPr/>
+        <p:nvPr/>
+      </p:nvGrpSpPr>
+      <p:grpSpPr>
+        <a:xfrm>
+          <a:off x="0" y="0"/>
+          <a:ext cx="0" cy="0"/>
+          <a:chOff x="0" y="0"/>
+          <a:chExt cx="0" cy="0"/>
+        </a:xfrm>
+      </p:grpSpPr>
+      <p:pic>
+        <p:nvPicPr>
+          <p:cNvPr id="11" name="Picture 10"/>
+          <p:cNvPicPr>
+            <a:picLocks noChangeAspect="1"/>
+          </p:cNvPicPr>
+          <p:nvPr/>
+        </p:nvPicPr>
+        <p:blipFill rotWithShape="1">
+          <a:blip r:embed="rId3"/>
+          <a:srcRect l="5450" t="42640" r="8360" b="38373"/>
+          <a:stretch/>
+        </p:blipFill>
+        <p:spPr>
+          <a:xfrm>
+            <a:off x="521841" y="4399065"/>
+            <a:ext cx="9690573" cy="1595619"/>
+          </a:xfrm>
+          <a:prstGeom prst="rect">
+            <a:avLst/>
+          </a:prstGeom>
+        </p:spPr>
+      </p:pic>
+      <p:cxnSp>
+        <p:nvCxnSpPr>
+          <p:cNvPr id="13" name="Straight Connector 12"/>
+          <p:cNvCxnSpPr/>
+          <p:nvPr/>
+        </p:nvCxnSpPr>
+        <p:spPr>
+          <a:xfrm flipV="1">
+            <a:off x="1369560" y="4842933"/>
+            <a:ext cx="4929640" cy="36571"/>
+          </a:xfrm>
+          <a:prstGeom prst="line">
+            <a:avLst/>
+          </a:prstGeom>
+          <a:ln w="28575">
+            <a:solidFill>
+              <a:srgbClr val="FF0000"/>
+            </a:solidFill>
+          </a:ln>
+        </p:spPr>
+        <p:style>
+          <a:lnRef idx="1">
+            <a:schemeClr val="accent1"/>
+          </a:lnRef>
+          <a:fillRef idx="0">
+            <a:schemeClr val="accent1"/>
+          </a:fillRef>
+          <a:effectRef idx="0">
+            <a:schemeClr val="accent1"/>
+          </a:effectRef>
+          <a:fontRef idx="minor">
+            <a:schemeClr val="tx1"/>
+          </a:fontRef>
+        </p:style>
+      </p:cxnSp>
+      <p:cxnSp>
+        <p:nvCxnSpPr>
+          <p:cNvPr id="16" name="Straight Connector 15"/>
+          <p:cNvCxnSpPr/>
+          <p:nvPr/>
+        </p:nvCxnSpPr>
+        <p:spPr>
+          <a:xfrm>
+            <a:off x="1595338" y="5853308"/>
+            <a:ext cx="4201662" cy="21986"/>
+          </a:xfrm>
+          <a:prstGeom prst="line">
+            <a:avLst/>
+          </a:prstGeom>
+          <a:ln w="28575">
+            <a:solidFill>
+              <a:srgbClr val="FF0000"/>
+            </a:solidFill>
+          </a:ln>
+        </p:spPr>
+        <p:style>
+          <a:lnRef idx="1">
+            <a:schemeClr val="accent1"/>
+          </a:lnRef>
+          <a:fillRef idx="0">
+            <a:schemeClr val="accent1"/>
+          </a:fillRef>
+          <a:effectRef idx="0">
+            <a:schemeClr val="accent1"/>
+          </a:effectRef>
+          <a:fontRef idx="minor">
+            <a:schemeClr val="tx1"/>
+          </a:fontRef>
+        </p:style>
+      </p:cxnSp>
+      <p:pic>
+        <p:nvPicPr>
+          <p:cNvPr id="18" name="Picture 17"/>
+          <p:cNvPicPr>
+            <a:picLocks noChangeAspect="1"/>
+          </p:cNvPicPr>
+          <p:nvPr/>
+        </p:nvPicPr>
+        <p:blipFill rotWithShape="1">
+          <a:blip r:embed="rId4"/>
+          <a:srcRect l="5371" t="67723" r="9550" b="23168"/>
+          <a:stretch/>
+        </p:blipFill>
+        <p:spPr>
+          <a:xfrm>
+            <a:off x="521841" y="5994684"/>
+            <a:ext cx="9179208" cy="680820"/>
+          </a:xfrm>
+          <a:prstGeom prst="rect">
+            <a:avLst/>
+          </a:prstGeom>
+        </p:spPr>
+      </p:pic>
+      <p:pic>
+        <p:nvPicPr>
+          <p:cNvPr id="17" name="Picture 6" descr="https://dv3ta1lexo3ac.cloudfront.net/dimg/700x700/dimg/dreamstime_s_119950933.jpg"/>
+          <p:cNvPicPr>
+            <a:picLocks noChangeAspect="1" noChangeArrowheads="1"/>
+          </p:cNvPicPr>
+          <p:nvPr/>
+        </p:nvPicPr>
+        <p:blipFill>
+          <a:blip r:embed="rId5">
+            <a:extLst>
+              <a:ext uri="{28A0092B-C50C-407E-A947-70E740481C1C}">
+                <a14:useLocalDpi xmlns:a14="http://schemas.microsoft.com/office/drawing/2010/main" val="0"/>
+              </a:ext>
+            </a:extLst>
+          </a:blip>
+          <a:srcRect/>
+          <a:stretch>
+            <a:fillRect/>
+          </a:stretch>
+        </p:blipFill>
+        <p:spPr bwMode="auto">
+          <a:xfrm>
+            <a:off x="8308358" y="187871"/>
+            <a:ext cx="3462714" cy="4177469"/>
+          </a:xfrm>
+          <a:prstGeom prst="rect">
+            <a:avLst/>
+          </a:prstGeom>
+          <a:noFill/>
+          <a:extLst>
+            <a:ext uri="{909E8E84-426E-40DD-AFC4-6F175D3DCCD1}">
+              <a14:hiddenFill xmlns:a14="http://schemas.microsoft.com/office/drawing/2010/main">
+                <a:solidFill>
+                  <a:srgbClr val="FFFFFF"/>
+                </a:solidFill>
+              </a14:hiddenFill>
+            </a:ext>
+          </a:extLst>
+        </p:spPr>
+      </p:pic>
+      <p:pic>
+        <p:nvPicPr>
+          <p:cNvPr id="5" name="Picture 4"/>
+          <p:cNvPicPr>
+            <a:picLocks noChangeAspect="1"/>
+          </p:cNvPicPr>
+          <p:nvPr/>
+        </p:nvPicPr>
+        <p:blipFill rotWithShape="1">
+          <a:blip r:embed="rId6"/>
+          <a:srcRect l="17715" t="42602" r="18924" b="9989"/>
+          <a:stretch/>
+        </p:blipFill>
+        <p:spPr>
+          <a:xfrm>
+            <a:off x="344648" y="207175"/>
+            <a:ext cx="7963710" cy="3724292"/>
+          </a:xfrm>
+          <a:prstGeom prst="rect">
+            <a:avLst/>
+          </a:prstGeom>
+        </p:spPr>
+      </p:pic>
+      <p:sp>
+        <p:nvSpPr>
+          <p:cNvPr id="4" name="Oval 3"/>
+          <p:cNvSpPr/>
+          <p:nvPr/>
+        </p:nvSpPr>
+        <p:spPr>
+          <a:xfrm>
+            <a:off x="1207910" y="3425261"/>
+            <a:ext cx="1348529" cy="302492"/>
+          </a:xfrm>
+          <a:prstGeom prst="ellipse">
+            <a:avLst/>
+          </a:prstGeom>
+          <a:noFill/>
+          <a:ln w="38100">
+            <a:solidFill>
+              <a:srgbClr val="FF0000"/>
+            </a:solidFill>
+          </a:ln>
+        </p:spPr>
+        <p:style>
+          <a:lnRef idx="2">
+            <a:schemeClr val="accent1">
+              <a:shade val="50000"/>
+            </a:schemeClr>
+          </a:lnRef>
+          <a:fillRef idx="1">
+            <a:schemeClr val="accent1"/>
+          </a:fillRef>
+          <a:effectRef idx="0">
+            <a:schemeClr val="accent1"/>
+          </a:effectRef>
+          <a:fontRef idx="minor">
+            <a:schemeClr val="lt1"/>
+          </a:fontRef>
+        </p:style>
+        <p:txBody>
+          <a:bodyPr rtlCol="0" anchor="ctr"/>
+          <a:lstStyle/>
+          <a:p>
+            <a:pPr algn="ctr"/>
+            <a:endParaRPr lang="en-AU"/>
+          </a:p>
+        </p:txBody>
+      </p:sp>
+    </p:spTree>
+    <p:extLst>
+      <p:ext uri="{BB962C8B-B14F-4D97-AF65-F5344CB8AC3E}">
+        <p14:creationId xmlns:p14="http://schemas.microsoft.com/office/powerpoint/2010/main" val="2436456634"/>
       </p:ext>
     </p:extLst>
   </p:cSld>

</xml_diff>